<commit_message>
paper 1 half done
</commit_message>
<xml_diff>
--- a/summer_Basics of RS.pptx
+++ b/summer_Basics of RS.pptx
@@ -5,25 +5,30 @@
     <p:sldMasterId id="2147483792" r:id="rId1"/>
   </p:sldMasterIdLst>
   <p:notesMasterIdLst>
-    <p:notesMasterId r:id="rId18"/>
+    <p:notesMasterId r:id="rId23"/>
   </p:notesMasterIdLst>
   <p:sldIdLst>
     <p:sldId id="256" r:id="rId2"/>
     <p:sldId id="264" r:id="rId3"/>
     <p:sldId id="268" r:id="rId4"/>
-    <p:sldId id="269" r:id="rId5"/>
-    <p:sldId id="271" r:id="rId6"/>
-    <p:sldId id="270" r:id="rId7"/>
-    <p:sldId id="272" r:id="rId8"/>
-    <p:sldId id="274" r:id="rId9"/>
-    <p:sldId id="275" r:id="rId10"/>
-    <p:sldId id="276" r:id="rId11"/>
-    <p:sldId id="277" r:id="rId12"/>
-    <p:sldId id="279" r:id="rId13"/>
-    <p:sldId id="281" r:id="rId14"/>
-    <p:sldId id="278" r:id="rId15"/>
-    <p:sldId id="280" r:id="rId16"/>
-    <p:sldId id="267" r:id="rId17"/>
+    <p:sldId id="286" r:id="rId5"/>
+    <p:sldId id="269" r:id="rId6"/>
+    <p:sldId id="271" r:id="rId7"/>
+    <p:sldId id="270" r:id="rId8"/>
+    <p:sldId id="272" r:id="rId9"/>
+    <p:sldId id="274" r:id="rId10"/>
+    <p:sldId id="284" r:id="rId11"/>
+    <p:sldId id="275" r:id="rId12"/>
+    <p:sldId id="283" r:id="rId13"/>
+    <p:sldId id="285" r:id="rId14"/>
+    <p:sldId id="276" r:id="rId15"/>
+    <p:sldId id="277" r:id="rId16"/>
+    <p:sldId id="279" r:id="rId17"/>
+    <p:sldId id="287" r:id="rId18"/>
+    <p:sldId id="281" r:id="rId19"/>
+    <p:sldId id="278" r:id="rId20"/>
+    <p:sldId id="280" r:id="rId21"/>
+    <p:sldId id="267" r:id="rId22"/>
   </p:sldIdLst>
   <p:sldSz cx="12190413" cy="6859588"/>
   <p:notesSz cx="6858000" cy="9144000"/>
@@ -3973,7 +3978,7 @@
           <a:p>
             <a:r>
               <a:rPr lang="en-IN" dirty="0" smtClean="0"/>
-              <a:t>Demographic Filtering</a:t>
+              <a:t>Model Based CF</a:t>
             </a:r>
             <a:endParaRPr lang="en-IN" dirty="0"/>
           </a:p>
@@ -3981,32 +3986,471 @@
       </p:sp>
       <p:sp>
         <p:nvSpPr>
-          <p:cNvPr id="3" name="Content Placeholder 2"/>
-          <p:cNvSpPr>
-            <a:spLocks noGrp="1"/>
-          </p:cNvSpPr>
-          <p:nvPr>
-            <p:ph idx="1"/>
-          </p:nvPr>
-        </p:nvSpPr>
-        <p:spPr/>
-        <p:txBody>
-          <a:bodyPr/>
-          <a:lstStyle/>
-          <a:p>
-            <a:r>
-              <a:rPr lang="en-IN" dirty="0" smtClean="0">
+          <p:cNvPr id="5" name="Rectangle: Rounded Corners 5"/>
+          <p:cNvSpPr/>
+          <p:nvPr/>
+        </p:nvSpPr>
+        <p:spPr>
+          <a:xfrm>
+            <a:off x="2494806" y="1773610"/>
+            <a:ext cx="7272808" cy="4248472"/>
+          </a:xfrm>
+          <a:prstGeom prst="roundRect">
+            <a:avLst/>
+          </a:prstGeom>
+        </p:spPr>
+        <p:style>
+          <a:lnRef idx="1">
+            <a:schemeClr val="accent1"/>
+          </a:lnRef>
+          <a:fillRef idx="2">
+            <a:schemeClr val="accent1"/>
+          </a:fillRef>
+          <a:effectRef idx="1">
+            <a:schemeClr val="accent1"/>
+          </a:effectRef>
+          <a:fontRef idx="minor">
+            <a:schemeClr val="dk1"/>
+          </a:fontRef>
+        </p:style>
+        <p:txBody>
+          <a:bodyPr rtlCol="0" anchor="ctr"/>
+          <a:lstStyle/>
+          <a:p>
+            <a:pPr algn="ctr"/>
+            <a:endParaRPr lang="en-US" b="1" dirty="0" smtClean="0">
+              <a:solidFill>
+                <a:schemeClr val="bg1"/>
+              </a:solidFill>
+            </a:endParaRPr>
+          </a:p>
+          <a:p>
+            <a:pPr algn="ctr"/>
+            <a:endParaRPr lang="en-US" b="1" dirty="0" smtClean="0">
+              <a:solidFill>
+                <a:schemeClr val="bg1"/>
+              </a:solidFill>
+            </a:endParaRPr>
+          </a:p>
+          <a:p>
+            <a:pPr algn="ctr"/>
+            <a:endParaRPr lang="en-US" b="1" dirty="0" smtClean="0">
+              <a:solidFill>
+                <a:schemeClr val="bg1"/>
+              </a:solidFill>
+            </a:endParaRPr>
+          </a:p>
+          <a:p>
+            <a:pPr algn="ctr"/>
+            <a:endParaRPr lang="en-US" b="1" dirty="0" smtClean="0">
+              <a:solidFill>
+                <a:schemeClr val="bg1"/>
+              </a:solidFill>
+            </a:endParaRPr>
+          </a:p>
+          <a:p>
+            <a:pPr algn="ctr"/>
+            <a:endParaRPr lang="en-US" b="1" dirty="0" smtClean="0">
+              <a:solidFill>
+                <a:schemeClr val="bg1"/>
+              </a:solidFill>
+            </a:endParaRPr>
+          </a:p>
+          <a:p>
+            <a:pPr algn="ctr"/>
+            <a:endParaRPr lang="en-US" b="1" dirty="0" smtClean="0">
+              <a:solidFill>
+                <a:schemeClr val="bg1"/>
+              </a:solidFill>
+            </a:endParaRPr>
+          </a:p>
+          <a:p>
+            <a:pPr algn="ctr"/>
+            <a:endParaRPr lang="en-US" b="1" dirty="0" smtClean="0">
+              <a:solidFill>
+                <a:schemeClr val="bg1"/>
+              </a:solidFill>
+            </a:endParaRPr>
+          </a:p>
+          <a:p>
+            <a:pPr algn="ctr"/>
+            <a:endParaRPr lang="en-US" b="1" dirty="0" smtClean="0">
+              <a:solidFill>
+                <a:schemeClr val="bg1"/>
+              </a:solidFill>
+            </a:endParaRPr>
+          </a:p>
+          <a:p>
+            <a:pPr algn="ctr"/>
+            <a:endParaRPr lang="en-US" b="1" dirty="0" smtClean="0">
+              <a:solidFill>
+                <a:schemeClr val="bg1"/>
+              </a:solidFill>
+            </a:endParaRPr>
+          </a:p>
+          <a:p>
+            <a:pPr algn="ctr"/>
+            <a:endParaRPr lang="en-US" b="1" dirty="0" smtClean="0">
+              <a:solidFill>
+                <a:schemeClr val="bg1"/>
+              </a:solidFill>
+            </a:endParaRPr>
+          </a:p>
+          <a:p>
+            <a:pPr algn="ctr"/>
+            <a:endParaRPr lang="en-US" b="1" dirty="0" smtClean="0">
+              <a:solidFill>
+                <a:schemeClr val="bg1"/>
+              </a:solidFill>
+            </a:endParaRPr>
+          </a:p>
+          <a:p>
+            <a:pPr algn="ctr"/>
+            <a:endParaRPr lang="en-US" b="1" dirty="0" smtClean="0">
+              <a:solidFill>
+                <a:schemeClr val="bg1"/>
+              </a:solidFill>
+            </a:endParaRPr>
+          </a:p>
+          <a:p>
+            <a:pPr algn="ctr"/>
+            <a:endParaRPr lang="en-US" b="1" dirty="0" smtClean="0">
+              <a:solidFill>
+                <a:schemeClr val="bg1"/>
+              </a:solidFill>
+            </a:endParaRPr>
+          </a:p>
+          <a:p>
+            <a:pPr algn="ctr"/>
+            <a:r>
+              <a:rPr lang="en-US" sz="2400" b="1" dirty="0" smtClean="0">
                 <a:solidFill>
-                  <a:srgbClr val="FF0000"/>
+                  <a:schemeClr val="bg1"/>
                 </a:solidFill>
               </a:rPr>
-              <a:t>Details</a:t>
-            </a:r>
-            <a:endParaRPr lang="en-IN" dirty="0">
+              <a:t>Model Based CF</a:t>
+            </a:r>
+            <a:endParaRPr lang="en-US" sz="2400" b="1" dirty="0">
               <a:solidFill>
-                <a:srgbClr val="FF0000"/>
+                <a:schemeClr val="bg1"/>
               </a:solidFill>
             </a:endParaRPr>
+          </a:p>
+        </p:txBody>
+      </p:sp>
+      <p:sp>
+        <p:nvSpPr>
+          <p:cNvPr id="6" name="Rectangle: Rounded Corners 4"/>
+          <p:cNvSpPr/>
+          <p:nvPr/>
+        </p:nvSpPr>
+        <p:spPr>
+          <a:xfrm>
+            <a:off x="2926854" y="2277666"/>
+            <a:ext cx="1250014" cy="1101456"/>
+          </a:xfrm>
+          <a:prstGeom prst="roundRect">
+            <a:avLst/>
+          </a:prstGeom>
+        </p:spPr>
+        <p:style>
+          <a:lnRef idx="2">
+            <a:schemeClr val="accent1">
+              <a:shade val="50000"/>
+            </a:schemeClr>
+          </a:lnRef>
+          <a:fillRef idx="1">
+            <a:schemeClr val="accent1"/>
+          </a:fillRef>
+          <a:effectRef idx="0">
+            <a:schemeClr val="accent1"/>
+          </a:effectRef>
+          <a:fontRef idx="minor">
+            <a:schemeClr val="lt1"/>
+          </a:fontRef>
+        </p:style>
+        <p:txBody>
+          <a:bodyPr rtlCol="0" anchor="ctr"/>
+          <a:lstStyle/>
+          <a:p>
+            <a:pPr algn="ctr"/>
+            <a:r>
+              <a:rPr lang="en-US" dirty="0" smtClean="0"/>
+              <a:t>SVD</a:t>
+            </a:r>
+            <a:endParaRPr lang="en-US" dirty="0"/>
+          </a:p>
+        </p:txBody>
+      </p:sp>
+      <p:sp>
+        <p:nvSpPr>
+          <p:cNvPr id="7" name="Rectangle: Rounded Corners 4"/>
+          <p:cNvSpPr/>
+          <p:nvPr/>
+        </p:nvSpPr>
+        <p:spPr>
+          <a:xfrm>
+            <a:off x="4390642" y="2277666"/>
+            <a:ext cx="1704564" cy="1101456"/>
+          </a:xfrm>
+          <a:prstGeom prst="roundRect">
+            <a:avLst/>
+          </a:prstGeom>
+        </p:spPr>
+        <p:style>
+          <a:lnRef idx="2">
+            <a:schemeClr val="accent1">
+              <a:shade val="50000"/>
+            </a:schemeClr>
+          </a:lnRef>
+          <a:fillRef idx="1">
+            <a:schemeClr val="accent1"/>
+          </a:fillRef>
+          <a:effectRef idx="0">
+            <a:schemeClr val="accent1"/>
+          </a:effectRef>
+          <a:fontRef idx="minor">
+            <a:schemeClr val="lt1"/>
+          </a:fontRef>
+        </p:style>
+        <p:txBody>
+          <a:bodyPr rtlCol="0" anchor="ctr"/>
+          <a:lstStyle/>
+          <a:p>
+            <a:pPr algn="ctr"/>
+            <a:r>
+              <a:rPr lang="en-US" dirty="0" smtClean="0"/>
+              <a:t>Bayesian</a:t>
+            </a:r>
+            <a:endParaRPr lang="en-US" dirty="0"/>
+          </a:p>
+        </p:txBody>
+      </p:sp>
+      <p:sp>
+        <p:nvSpPr>
+          <p:cNvPr id="8" name="Rectangle: Rounded Corners 4"/>
+          <p:cNvSpPr/>
+          <p:nvPr/>
+        </p:nvSpPr>
+        <p:spPr>
+          <a:xfrm>
+            <a:off x="6311230" y="2277666"/>
+            <a:ext cx="1250014" cy="1101456"/>
+          </a:xfrm>
+          <a:prstGeom prst="roundRect">
+            <a:avLst/>
+          </a:prstGeom>
+        </p:spPr>
+        <p:style>
+          <a:lnRef idx="2">
+            <a:schemeClr val="accent1">
+              <a:shade val="50000"/>
+            </a:schemeClr>
+          </a:lnRef>
+          <a:fillRef idx="1">
+            <a:schemeClr val="accent1"/>
+          </a:fillRef>
+          <a:effectRef idx="0">
+            <a:schemeClr val="accent1"/>
+          </a:effectRef>
+          <a:fontRef idx="minor">
+            <a:schemeClr val="lt1"/>
+          </a:fontRef>
+        </p:style>
+        <p:txBody>
+          <a:bodyPr rtlCol="0" anchor="ctr"/>
+          <a:lstStyle/>
+          <a:p>
+            <a:pPr algn="ctr"/>
+            <a:r>
+              <a:rPr lang="en-US" dirty="0" smtClean="0"/>
+              <a:t>NN</a:t>
+            </a:r>
+            <a:endParaRPr lang="en-US" dirty="0"/>
+          </a:p>
+        </p:txBody>
+      </p:sp>
+      <p:sp>
+        <p:nvSpPr>
+          <p:cNvPr id="9" name="Rectangle: Rounded Corners 4"/>
+          <p:cNvSpPr/>
+          <p:nvPr/>
+        </p:nvSpPr>
+        <p:spPr>
+          <a:xfrm>
+            <a:off x="7858277" y="2277666"/>
+            <a:ext cx="1477289" cy="1101456"/>
+          </a:xfrm>
+          <a:prstGeom prst="roundRect">
+            <a:avLst/>
+          </a:prstGeom>
+        </p:spPr>
+        <p:style>
+          <a:lnRef idx="2">
+            <a:schemeClr val="accent1">
+              <a:shade val="50000"/>
+            </a:schemeClr>
+          </a:lnRef>
+          <a:fillRef idx="1">
+            <a:schemeClr val="accent1"/>
+          </a:fillRef>
+          <a:effectRef idx="0">
+            <a:schemeClr val="accent1"/>
+          </a:effectRef>
+          <a:fontRef idx="minor">
+            <a:schemeClr val="lt1"/>
+          </a:fontRef>
+        </p:style>
+        <p:txBody>
+          <a:bodyPr rtlCol="0" anchor="ctr"/>
+          <a:lstStyle/>
+          <a:p>
+            <a:pPr algn="ctr"/>
+            <a:r>
+              <a:rPr lang="en-US" dirty="0" smtClean="0"/>
+              <a:t>Fuzzy system</a:t>
+            </a:r>
+            <a:endParaRPr lang="en-US" dirty="0"/>
+          </a:p>
+        </p:txBody>
+      </p:sp>
+      <p:sp>
+        <p:nvSpPr>
+          <p:cNvPr id="10" name="Rectangle: Rounded Corners 4"/>
+          <p:cNvSpPr/>
+          <p:nvPr/>
+        </p:nvSpPr>
+        <p:spPr>
+          <a:xfrm>
+            <a:off x="2854846" y="3789834"/>
+            <a:ext cx="2045477" cy="1101456"/>
+          </a:xfrm>
+          <a:prstGeom prst="roundRect">
+            <a:avLst/>
+          </a:prstGeom>
+        </p:spPr>
+        <p:style>
+          <a:lnRef idx="2">
+            <a:schemeClr val="accent1">
+              <a:shade val="50000"/>
+            </a:schemeClr>
+          </a:lnRef>
+          <a:fillRef idx="1">
+            <a:schemeClr val="accent1"/>
+          </a:fillRef>
+          <a:effectRef idx="0">
+            <a:schemeClr val="accent1"/>
+          </a:effectRef>
+          <a:fontRef idx="minor">
+            <a:schemeClr val="lt1"/>
+          </a:fontRef>
+        </p:style>
+        <p:txBody>
+          <a:bodyPr rtlCol="0" anchor="ctr"/>
+          <a:lstStyle/>
+          <a:p>
+            <a:pPr algn="ctr"/>
+            <a:r>
+              <a:rPr lang="en-US" dirty="0" smtClean="0"/>
+              <a:t>Genetic </a:t>
+            </a:r>
+            <a:r>
+              <a:rPr lang="en-US" dirty="0" smtClean="0"/>
+              <a:t>A</a:t>
+            </a:r>
+            <a:r>
+              <a:rPr lang="en-US" dirty="0" smtClean="0"/>
+              <a:t>lgorithm</a:t>
+            </a:r>
+            <a:endParaRPr lang="en-US" dirty="0"/>
+          </a:p>
+        </p:txBody>
+      </p:sp>
+      <p:sp>
+        <p:nvSpPr>
+          <p:cNvPr id="11" name="Rectangle: Rounded Corners 4"/>
+          <p:cNvSpPr/>
+          <p:nvPr/>
+        </p:nvSpPr>
+        <p:spPr>
+          <a:xfrm>
+            <a:off x="5188355" y="3811170"/>
+            <a:ext cx="1590927" cy="1101456"/>
+          </a:xfrm>
+          <a:prstGeom prst="roundRect">
+            <a:avLst/>
+          </a:prstGeom>
+        </p:spPr>
+        <p:style>
+          <a:lnRef idx="2">
+            <a:schemeClr val="accent1">
+              <a:shade val="50000"/>
+            </a:schemeClr>
+          </a:lnRef>
+          <a:fillRef idx="1">
+            <a:schemeClr val="accent1"/>
+          </a:fillRef>
+          <a:effectRef idx="0">
+            <a:schemeClr val="accent1"/>
+          </a:effectRef>
+          <a:fontRef idx="minor">
+            <a:schemeClr val="lt1"/>
+          </a:fontRef>
+        </p:style>
+        <p:txBody>
+          <a:bodyPr rtlCol="0" anchor="ctr"/>
+          <a:lstStyle/>
+          <a:p>
+            <a:pPr algn="ctr"/>
+            <a:r>
+              <a:rPr lang="en-US" dirty="0" smtClean="0"/>
+              <a:t>Latent Feature</a:t>
+            </a:r>
+            <a:endParaRPr lang="en-US" dirty="0"/>
+          </a:p>
+        </p:txBody>
+      </p:sp>
+      <p:sp>
+        <p:nvSpPr>
+          <p:cNvPr id="12" name="Rectangle: Rounded Corners 4"/>
+          <p:cNvSpPr/>
+          <p:nvPr/>
+        </p:nvSpPr>
+        <p:spPr>
+          <a:xfrm>
+            <a:off x="7060563" y="3811170"/>
+            <a:ext cx="2272753" cy="1101456"/>
+          </a:xfrm>
+          <a:prstGeom prst="roundRect">
+            <a:avLst/>
+          </a:prstGeom>
+        </p:spPr>
+        <p:style>
+          <a:lnRef idx="2">
+            <a:schemeClr val="accent1">
+              <a:shade val="50000"/>
+            </a:schemeClr>
+          </a:lnRef>
+          <a:fillRef idx="1">
+            <a:schemeClr val="accent1"/>
+          </a:fillRef>
+          <a:effectRef idx="0">
+            <a:schemeClr val="accent1"/>
+          </a:effectRef>
+          <a:fontRef idx="minor">
+            <a:schemeClr val="lt1"/>
+          </a:fontRef>
+        </p:style>
+        <p:txBody>
+          <a:bodyPr rtlCol="0" anchor="ctr"/>
+          <a:lstStyle/>
+          <a:p>
+            <a:pPr algn="ctr"/>
+            <a:r>
+              <a:rPr lang="en-US" dirty="0" smtClean="0"/>
+              <a:t>Matrix Factorization</a:t>
+            </a:r>
+            <a:endParaRPr lang="en-US" dirty="0"/>
           </a:p>
         </p:txBody>
       </p:sp>
@@ -4052,7 +4496,7 @@
           <a:p>
             <a:r>
               <a:rPr lang="en-IN" dirty="0" smtClean="0"/>
-              <a:t>Hybrid Filtering</a:t>
+              <a:t>Model Based CF - SVD</a:t>
             </a:r>
             <a:endParaRPr lang="en-IN" dirty="0"/>
           </a:p>
@@ -4131,7 +4575,7 @@
           <a:p>
             <a:r>
               <a:rPr lang="en-IN" dirty="0" smtClean="0"/>
-              <a:t>Evaluation</a:t>
+              <a:t>Model Based CF – Matrix Factorization</a:t>
             </a:r>
             <a:endParaRPr lang="en-IN" dirty="0"/>
           </a:p>
@@ -4151,31 +4595,6 @@
         <p:txBody>
           <a:bodyPr/>
           <a:lstStyle/>
-          <a:p>
-            <a:r>
-              <a:rPr lang="en-IN" dirty="0" smtClean="0"/>
-              <a:t>Accuracy</a:t>
-            </a:r>
-          </a:p>
-          <a:p>
-            <a:r>
-              <a:rPr lang="en-IN" dirty="0" smtClean="0"/>
-              <a:t>Novelty</a:t>
-            </a:r>
-          </a:p>
-          <a:p>
-            <a:r>
-              <a:rPr lang="en-IN" dirty="0" err="1" smtClean="0"/>
-              <a:t>Dispersity</a:t>
-            </a:r>
-            <a:endParaRPr lang="en-IN" dirty="0" smtClean="0"/>
-          </a:p>
-          <a:p>
-            <a:r>
-              <a:rPr lang="en-IN" dirty="0" smtClean="0"/>
-              <a:t>Stability</a:t>
-            </a:r>
-          </a:p>
           <a:p>
             <a:r>
               <a:rPr lang="en-IN" dirty="0" smtClean="0">
@@ -4235,7 +4654,7 @@
           <a:p>
             <a:r>
               <a:rPr lang="en-IN" dirty="0" smtClean="0"/>
-              <a:t>Streaming RS</a:t>
+              <a:t>Collaborative Filtering</a:t>
             </a:r>
             <a:endParaRPr lang="en-IN" dirty="0"/>
           </a:p>
@@ -4262,13 +4681,17 @@
                   <a:srgbClr val="FF0000"/>
                 </a:solidFill>
               </a:rPr>
-              <a:t>Details</a:t>
-            </a:r>
-            <a:endParaRPr lang="en-IN" dirty="0">
-              <a:solidFill>
-                <a:srgbClr val="FF0000"/>
-              </a:solidFill>
-            </a:endParaRPr>
+              <a:t>Drawbacks</a:t>
+            </a:r>
+          </a:p>
+          <a:p>
+            <a:r>
+              <a:rPr lang="en-IN" dirty="0" smtClean="0"/>
+              <a:t>Cold Start Problem</a:t>
+            </a:r>
+          </a:p>
+          <a:p>
+            <a:endParaRPr lang="en-IN" dirty="0"/>
           </a:p>
         </p:txBody>
       </p:sp>
@@ -4313,127 +4736,41 @@
           <a:lstStyle/>
           <a:p>
             <a:r>
+              <a:rPr lang="en-IN" dirty="0" smtClean="0"/>
+              <a:t>Demographic Filtering</a:t>
+            </a:r>
+            <a:endParaRPr lang="en-IN" dirty="0"/>
+          </a:p>
+        </p:txBody>
+      </p:sp>
+      <p:sp>
+        <p:nvSpPr>
+          <p:cNvPr id="3" name="Content Placeholder 2"/>
+          <p:cNvSpPr>
+            <a:spLocks noGrp="1"/>
+          </p:cNvSpPr>
+          <p:nvPr>
+            <p:ph idx="1"/>
+          </p:nvPr>
+        </p:nvSpPr>
+        <p:spPr/>
+        <p:txBody>
+          <a:bodyPr/>
+          <a:lstStyle/>
+          <a:p>
+            <a:r>
               <a:rPr lang="en-IN" dirty="0" smtClean="0">
                 <a:solidFill>
                   <a:srgbClr val="FF0000"/>
                 </a:solidFill>
               </a:rPr>
-              <a:t>Topics to cover</a:t>
+              <a:t>Details</a:t>
             </a:r>
             <a:endParaRPr lang="en-IN" dirty="0">
               <a:solidFill>
                 <a:srgbClr val="FF0000"/>
               </a:solidFill>
             </a:endParaRPr>
-          </a:p>
-        </p:txBody>
-      </p:sp>
-      <p:sp>
-        <p:nvSpPr>
-          <p:cNvPr id="3" name="Content Placeholder 2"/>
-          <p:cNvSpPr>
-            <a:spLocks noGrp="1"/>
-          </p:cNvSpPr>
-          <p:nvPr>
-            <p:ph idx="1"/>
-          </p:nvPr>
-        </p:nvSpPr>
-        <p:spPr/>
-        <p:txBody>
-          <a:bodyPr/>
-          <a:lstStyle/>
-          <a:p>
-            <a:r>
-              <a:rPr lang="en-IN" dirty="0" smtClean="0">
-                <a:solidFill>
-                  <a:srgbClr val="FF0000"/>
-                </a:solidFill>
-              </a:rPr>
-              <a:t>Group</a:t>
-            </a:r>
-          </a:p>
-          <a:p>
-            <a:r>
-              <a:rPr lang="en-IN" dirty="0" smtClean="0">
-                <a:solidFill>
-                  <a:srgbClr val="FF0000"/>
-                </a:solidFill>
-              </a:rPr>
-              <a:t>Graph</a:t>
-            </a:r>
-          </a:p>
-          <a:p>
-            <a:r>
-              <a:rPr lang="en-IN" dirty="0" smtClean="0">
-                <a:solidFill>
-                  <a:srgbClr val="FF0000"/>
-                </a:solidFill>
-              </a:rPr>
-              <a:t>Implicit Feedback</a:t>
-            </a:r>
-          </a:p>
-          <a:p>
-            <a:r>
-              <a:rPr lang="en-IN" dirty="0" smtClean="0">
-                <a:solidFill>
-                  <a:srgbClr val="FF0000"/>
-                </a:solidFill>
-              </a:rPr>
-              <a:t>Data </a:t>
-            </a:r>
-            <a:r>
-              <a:rPr lang="en-IN" dirty="0" err="1" smtClean="0">
-                <a:solidFill>
-                  <a:srgbClr val="FF0000"/>
-                </a:solidFill>
-              </a:rPr>
-              <a:t>Sparsity</a:t>
-            </a:r>
-            <a:endParaRPr lang="en-IN" dirty="0" smtClean="0">
-              <a:solidFill>
-                <a:srgbClr val="FF0000"/>
-              </a:solidFill>
-            </a:endParaRPr>
-          </a:p>
-          <a:p>
-            <a:r>
-              <a:rPr lang="en-IN" dirty="0" smtClean="0">
-                <a:solidFill>
-                  <a:srgbClr val="FF0000"/>
-                </a:solidFill>
-              </a:rPr>
-              <a:t>Cold Start Problem</a:t>
-            </a:r>
-          </a:p>
-          <a:p>
-            <a:r>
-              <a:rPr lang="en-IN" dirty="0" smtClean="0">
-                <a:solidFill>
-                  <a:srgbClr val="FF0000"/>
-                </a:solidFill>
-              </a:rPr>
-              <a:t>Scalability</a:t>
-            </a:r>
-          </a:p>
-          <a:p>
-            <a:r>
-              <a:rPr lang="en-IN" dirty="0" smtClean="0">
-                <a:solidFill>
-                  <a:srgbClr val="FF0000"/>
-                </a:solidFill>
-              </a:rPr>
-              <a:t>Normalization</a:t>
-            </a:r>
-          </a:p>
-          <a:p>
-            <a:r>
-              <a:rPr lang="en-IN" dirty="0" smtClean="0">
-                <a:solidFill>
-                  <a:srgbClr val="FF0000"/>
-                </a:solidFill>
-              </a:rPr>
-              <a:t>bias</a:t>
-            </a:r>
           </a:p>
         </p:txBody>
       </p:sp>
@@ -4479,7 +4816,7 @@
           <a:p>
             <a:r>
               <a:rPr lang="en-IN" dirty="0" smtClean="0"/>
-              <a:t>Future &amp; Challenges</a:t>
+              <a:t>Hybrid Filtering</a:t>
             </a:r>
             <a:endParaRPr lang="en-IN" dirty="0"/>
           </a:p>
@@ -4527,14 +4864,6 @@
 <file path=ppt/slides/slide16.xml><?xml version="1.0" encoding="utf-8"?>
 <p:sld xmlns:a="http://schemas.openxmlformats.org/drawingml/2006/main" xmlns:r="http://schemas.openxmlformats.org/officeDocument/2006/relationships" xmlns:p="http://schemas.openxmlformats.org/presentationml/2006/main">
   <p:cSld>
-    <p:bg>
-      <p:bgPr>
-        <a:solidFill>
-          <a:srgbClr val="0078D7"/>
-        </a:solidFill>
-        <a:effectLst/>
-      </p:bgPr>
-    </p:bg>
     <p:spTree>
       <p:nvGrpSpPr>
         <p:cNvPr id="1" name=""/>
@@ -4551,14 +4880,695 @@
       </p:grpSpPr>
       <p:sp>
         <p:nvSpPr>
-          <p:cNvPr id="5" name="TextBox 4"/>
+          <p:cNvPr id="2" name="Title 1"/>
+          <p:cNvSpPr>
+            <a:spLocks noGrp="1"/>
+          </p:cNvSpPr>
+          <p:nvPr>
+            <p:ph type="title"/>
+          </p:nvPr>
+        </p:nvSpPr>
+        <p:spPr/>
+        <p:txBody>
+          <a:bodyPr/>
+          <a:lstStyle/>
+          <a:p>
+            <a:r>
+              <a:rPr lang="en-IN" dirty="0" smtClean="0"/>
+              <a:t>Evaluation</a:t>
+            </a:r>
+            <a:endParaRPr lang="en-IN" dirty="0"/>
+          </a:p>
+        </p:txBody>
+      </p:sp>
+      <p:sp>
+        <p:nvSpPr>
+          <p:cNvPr id="3" name="Content Placeholder 2"/>
+          <p:cNvSpPr>
+            <a:spLocks noGrp="1"/>
+          </p:cNvSpPr>
+          <p:nvPr>
+            <p:ph idx="1"/>
+          </p:nvPr>
+        </p:nvSpPr>
+        <p:spPr/>
+        <p:txBody>
+          <a:bodyPr/>
+          <a:lstStyle/>
+          <a:p>
+            <a:r>
+              <a:rPr lang="en-IN" b="1" dirty="0" smtClean="0"/>
+              <a:t>Prediction</a:t>
+            </a:r>
+            <a:r>
+              <a:rPr lang="en-IN" dirty="0" smtClean="0"/>
+              <a:t> Evaluation</a:t>
+            </a:r>
+          </a:p>
+          <a:p>
+            <a:pPr lvl="1"/>
+            <a:r>
+              <a:rPr lang="en-IN" dirty="0" smtClean="0"/>
+              <a:t>Metric - MAE, RMSE, Coverage</a:t>
+            </a:r>
+          </a:p>
+          <a:p>
+            <a:r>
+              <a:rPr lang="en-IN" dirty="0" smtClean="0"/>
+              <a:t>Evaluation of </a:t>
+            </a:r>
+            <a:r>
+              <a:rPr lang="en-IN" b="1" dirty="0" smtClean="0"/>
+              <a:t>set</a:t>
+            </a:r>
+            <a:r>
+              <a:rPr lang="en-IN" dirty="0" smtClean="0"/>
+              <a:t> of recommended items</a:t>
+            </a:r>
+          </a:p>
+          <a:p>
+            <a:pPr lvl="1"/>
+            <a:r>
+              <a:rPr lang="en-IN" dirty="0" smtClean="0"/>
+              <a:t>Metric – Precision, Recall, F1</a:t>
+            </a:r>
+          </a:p>
+          <a:p>
+            <a:r>
+              <a:rPr lang="en-IN" dirty="0" smtClean="0"/>
+              <a:t>Evaluation of </a:t>
+            </a:r>
+            <a:r>
+              <a:rPr lang="en-IN" b="1" dirty="0" smtClean="0"/>
+              <a:t>ranked</a:t>
+            </a:r>
+            <a:r>
+              <a:rPr lang="en-IN" dirty="0" smtClean="0"/>
+              <a:t> recommended items</a:t>
+            </a:r>
+          </a:p>
+          <a:p>
+            <a:pPr lvl="1"/>
+            <a:r>
+              <a:rPr lang="en-IN" dirty="0" smtClean="0"/>
+              <a:t>Metric – Half life, discounted cumulative gain</a:t>
+            </a:r>
+          </a:p>
+          <a:p>
+            <a:endParaRPr lang="en-IN" dirty="0"/>
+          </a:p>
+        </p:txBody>
+      </p:sp>
+      <p:sp>
+        <p:nvSpPr>
+          <p:cNvPr id="4" name="Content Placeholder 2"/>
+          <p:cNvSpPr txBox="1">
+            <a:spLocks/>
+          </p:cNvSpPr>
+          <p:nvPr/>
+        </p:nvSpPr>
+        <p:spPr>
+          <a:xfrm>
+            <a:off x="8543478" y="1125538"/>
+            <a:ext cx="2889236" cy="3117024"/>
+          </a:xfrm>
+          <a:prstGeom prst="rect">
+            <a:avLst/>
+          </a:prstGeom>
+        </p:spPr>
+        <p:style>
+          <a:lnRef idx="2">
+            <a:schemeClr val="dk1"/>
+          </a:lnRef>
+          <a:fillRef idx="1">
+            <a:schemeClr val="lt1"/>
+          </a:fillRef>
+          <a:effectRef idx="0">
+            <a:schemeClr val="dk1"/>
+          </a:effectRef>
+          <a:fontRef idx="minor">
+            <a:schemeClr val="dk1"/>
+          </a:fontRef>
+        </p:style>
+        <p:txBody>
+          <a:bodyPr vert="horz" lIns="91440" tIns="45720" rIns="91440" bIns="45720" rtlCol="0">
+            <a:normAutofit/>
+          </a:bodyPr>
+          <a:lstStyle/>
+          <a:p>
+            <a:pPr marL="228577" marR="0" lvl="0" indent="-228577" algn="l" defTabSz="914309" rtl="0" eaLnBrk="1" fontAlgn="auto" latinLnBrk="0" hangingPunct="1">
+              <a:lnSpc>
+                <a:spcPct val="90000"/>
+              </a:lnSpc>
+              <a:spcBef>
+                <a:spcPts val="1000"/>
+              </a:spcBef>
+              <a:spcAft>
+                <a:spcPts val="0"/>
+              </a:spcAft>
+              <a:buClrTx/>
+              <a:buSzTx/>
+              <a:tabLst/>
+              <a:defRPr/>
+            </a:pPr>
+            <a:r>
+              <a:rPr kumimoji="0" lang="en-IN" sz="2800" b="0" i="0" u="none" strike="noStrike" kern="1200" cap="none" spc="0" normalizeH="0" baseline="0" noProof="0" dirty="0" smtClean="0">
+                <a:ln>
+                  <a:noFill/>
+                </a:ln>
+                <a:solidFill>
+                  <a:schemeClr val="tx1"/>
+                </a:solidFill>
+                <a:effectLst/>
+                <a:uLnTx/>
+                <a:uFillTx/>
+                <a:latin typeface="+mn-lt"/>
+                <a:ea typeface="+mn-ea"/>
+                <a:cs typeface="+mn-cs"/>
+              </a:rPr>
+              <a:t>Desired Properties</a:t>
+            </a:r>
+          </a:p>
+          <a:p>
+            <a:pPr marL="228577" marR="0" lvl="0" indent="-228577" algn="l" defTabSz="914309" rtl="0" eaLnBrk="1" fontAlgn="auto" latinLnBrk="0" hangingPunct="1">
+              <a:lnSpc>
+                <a:spcPct val="90000"/>
+              </a:lnSpc>
+              <a:spcBef>
+                <a:spcPts val="1000"/>
+              </a:spcBef>
+              <a:spcAft>
+                <a:spcPts val="0"/>
+              </a:spcAft>
+              <a:buClrTx/>
+              <a:buSzTx/>
+              <a:buFont typeface="Arial" panose="020B0604020202020204" pitchFamily="34" charset="0"/>
+              <a:buChar char="•"/>
+              <a:tabLst/>
+              <a:defRPr/>
+            </a:pPr>
+            <a:r>
+              <a:rPr kumimoji="0" lang="en-IN" sz="2800" b="0" i="0" u="none" strike="noStrike" kern="1200" cap="none" spc="0" normalizeH="0" baseline="0" noProof="0" dirty="0" smtClean="0">
+                <a:ln>
+                  <a:noFill/>
+                </a:ln>
+                <a:solidFill>
+                  <a:schemeClr val="tx1"/>
+                </a:solidFill>
+                <a:effectLst/>
+                <a:uLnTx/>
+                <a:uFillTx/>
+                <a:latin typeface="+mn-lt"/>
+                <a:ea typeface="+mn-ea"/>
+                <a:cs typeface="+mn-cs"/>
+              </a:rPr>
+              <a:t>Accuracy</a:t>
+            </a:r>
+          </a:p>
+          <a:p>
+            <a:pPr marL="228577" marR="0" lvl="0" indent="-228577" algn="l" defTabSz="914309" rtl="0" eaLnBrk="1" fontAlgn="auto" latinLnBrk="0" hangingPunct="1">
+              <a:lnSpc>
+                <a:spcPct val="90000"/>
+              </a:lnSpc>
+              <a:spcBef>
+                <a:spcPts val="1000"/>
+              </a:spcBef>
+              <a:spcAft>
+                <a:spcPts val="0"/>
+              </a:spcAft>
+              <a:buClrTx/>
+              <a:buSzTx/>
+              <a:buFont typeface="Arial" panose="020B0604020202020204" pitchFamily="34" charset="0"/>
+              <a:buChar char="•"/>
+              <a:tabLst/>
+              <a:defRPr/>
+            </a:pPr>
+            <a:r>
+              <a:rPr kumimoji="0" lang="en-IN" sz="2800" b="0" i="0" u="none" strike="noStrike" kern="1200" cap="none" spc="0" normalizeH="0" baseline="0" noProof="0" dirty="0" smtClean="0">
+                <a:ln>
+                  <a:noFill/>
+                </a:ln>
+                <a:solidFill>
+                  <a:schemeClr val="tx1"/>
+                </a:solidFill>
+                <a:effectLst/>
+                <a:uLnTx/>
+                <a:uFillTx/>
+                <a:latin typeface="+mn-lt"/>
+                <a:ea typeface="+mn-ea"/>
+                <a:cs typeface="+mn-cs"/>
+              </a:rPr>
+              <a:t>Novelty</a:t>
+            </a:r>
+          </a:p>
+          <a:p>
+            <a:pPr marL="228577" marR="0" lvl="0" indent="-228577" algn="l" defTabSz="914309" rtl="0" eaLnBrk="1" fontAlgn="auto" latinLnBrk="0" hangingPunct="1">
+              <a:lnSpc>
+                <a:spcPct val="90000"/>
+              </a:lnSpc>
+              <a:spcBef>
+                <a:spcPts val="1000"/>
+              </a:spcBef>
+              <a:spcAft>
+                <a:spcPts val="0"/>
+              </a:spcAft>
+              <a:buClrTx/>
+              <a:buSzTx/>
+              <a:buFont typeface="Arial" panose="020B0604020202020204" pitchFamily="34" charset="0"/>
+              <a:buChar char="•"/>
+              <a:tabLst/>
+              <a:defRPr/>
+            </a:pPr>
+            <a:r>
+              <a:rPr kumimoji="0" lang="en-IN" sz="2800" b="0" i="0" u="none" strike="noStrike" kern="1200" cap="none" spc="0" normalizeH="0" baseline="0" noProof="0" dirty="0" smtClean="0">
+                <a:ln>
+                  <a:noFill/>
+                </a:ln>
+                <a:solidFill>
+                  <a:schemeClr val="tx1"/>
+                </a:solidFill>
+                <a:effectLst/>
+                <a:uLnTx/>
+                <a:uFillTx/>
+                <a:latin typeface="+mn-lt"/>
+                <a:ea typeface="+mn-ea"/>
+                <a:cs typeface="+mn-cs"/>
+              </a:rPr>
+              <a:t>Diversity</a:t>
+            </a:r>
+          </a:p>
+          <a:p>
+            <a:pPr marL="228577" marR="0" lvl="0" indent="-228577" algn="l" defTabSz="914309" rtl="0" eaLnBrk="1" fontAlgn="auto" latinLnBrk="0" hangingPunct="1">
+              <a:lnSpc>
+                <a:spcPct val="90000"/>
+              </a:lnSpc>
+              <a:spcBef>
+                <a:spcPts val="1000"/>
+              </a:spcBef>
+              <a:spcAft>
+                <a:spcPts val="0"/>
+              </a:spcAft>
+              <a:buClrTx/>
+              <a:buSzTx/>
+              <a:buFont typeface="Arial" panose="020B0604020202020204" pitchFamily="34" charset="0"/>
+              <a:buChar char="•"/>
+              <a:tabLst/>
+              <a:defRPr/>
+            </a:pPr>
+            <a:r>
+              <a:rPr kumimoji="0" lang="en-IN" sz="2800" b="0" i="0" u="none" strike="noStrike" kern="1200" cap="none" spc="0" normalizeH="0" baseline="0" noProof="0" dirty="0" smtClean="0">
+                <a:ln>
+                  <a:noFill/>
+                </a:ln>
+                <a:solidFill>
+                  <a:schemeClr val="tx1"/>
+                </a:solidFill>
+                <a:effectLst/>
+                <a:uLnTx/>
+                <a:uFillTx/>
+                <a:latin typeface="+mn-lt"/>
+                <a:ea typeface="+mn-ea"/>
+                <a:cs typeface="+mn-cs"/>
+              </a:rPr>
+              <a:t>Stability</a:t>
+            </a:r>
+          </a:p>
+          <a:p>
+            <a:pPr marL="228577" marR="0" lvl="0" indent="-228577" algn="l" defTabSz="914309" rtl="0" eaLnBrk="1" fontAlgn="auto" latinLnBrk="0" hangingPunct="1">
+              <a:lnSpc>
+                <a:spcPct val="90000"/>
+              </a:lnSpc>
+              <a:spcBef>
+                <a:spcPts val="1000"/>
+              </a:spcBef>
+              <a:spcAft>
+                <a:spcPts val="0"/>
+              </a:spcAft>
+              <a:buClrTx/>
+              <a:buSzTx/>
+              <a:buFont typeface="Arial" panose="020B0604020202020204" pitchFamily="34" charset="0"/>
+              <a:buChar char="•"/>
+              <a:tabLst/>
+              <a:defRPr/>
+            </a:pPr>
+            <a:r>
+              <a:rPr lang="en-IN" sz="2800" dirty="0" smtClean="0">
+                <a:solidFill>
+                  <a:schemeClr val="tx1"/>
+                </a:solidFill>
+              </a:rPr>
+              <a:t>Reliability</a:t>
+            </a:r>
+            <a:endParaRPr kumimoji="0" lang="en-IN" sz="2800" b="0" i="0" u="none" strike="noStrike" kern="1200" cap="none" spc="0" normalizeH="0" baseline="0" noProof="0" dirty="0" smtClean="0">
+              <a:ln>
+                <a:noFill/>
+              </a:ln>
+              <a:solidFill>
+                <a:schemeClr val="tx1"/>
+              </a:solidFill>
+              <a:effectLst/>
+              <a:uLnTx/>
+              <a:uFillTx/>
+              <a:latin typeface="+mn-lt"/>
+              <a:ea typeface="+mn-ea"/>
+              <a:cs typeface="+mn-cs"/>
+            </a:endParaRPr>
+          </a:p>
+        </p:txBody>
+      </p:sp>
+    </p:spTree>
+  </p:cSld>
+  <p:clrMapOvr>
+    <a:masterClrMapping/>
+  </p:clrMapOvr>
+</p:sld>
+</file>
+
+<file path=ppt/slides/slide17.xml><?xml version="1.0" encoding="utf-8"?>
+<p:sld xmlns:a="http://schemas.openxmlformats.org/drawingml/2006/main" xmlns:r="http://schemas.openxmlformats.org/officeDocument/2006/relationships" xmlns:p="http://schemas.openxmlformats.org/presentationml/2006/main">
+  <p:cSld>
+    <p:spTree>
+      <p:nvGrpSpPr>
+        <p:cNvPr id="1" name=""/>
+        <p:cNvGrpSpPr/>
+        <p:nvPr/>
+      </p:nvGrpSpPr>
+      <p:grpSpPr>
+        <a:xfrm>
+          <a:off x="0" y="0"/>
+          <a:ext cx="0" cy="0"/>
+          <a:chOff x="0" y="0"/>
+          <a:chExt cx="0" cy="0"/>
+        </a:xfrm>
+      </p:grpSpPr>
+      <p:sp>
+        <p:nvSpPr>
+          <p:cNvPr id="2" name="Title 1"/>
+          <p:cNvSpPr>
+            <a:spLocks noGrp="1"/>
+          </p:cNvSpPr>
+          <p:nvPr>
+            <p:ph type="title"/>
+          </p:nvPr>
+        </p:nvSpPr>
+        <p:spPr/>
+        <p:txBody>
+          <a:bodyPr/>
+          <a:lstStyle/>
+          <a:p>
+            <a:r>
+              <a:rPr lang="en-IN" dirty="0" smtClean="0"/>
+              <a:t>Evaluation formulas</a:t>
+            </a:r>
+            <a:endParaRPr lang="en-IN" dirty="0"/>
+          </a:p>
+        </p:txBody>
+      </p:sp>
+      <p:sp>
+        <p:nvSpPr>
+          <p:cNvPr id="3" name="Content Placeholder 2"/>
+          <p:cNvSpPr>
+            <a:spLocks noGrp="1"/>
+          </p:cNvSpPr>
+          <p:nvPr>
+            <p:ph idx="1"/>
+          </p:nvPr>
+        </p:nvSpPr>
+        <p:spPr/>
+        <p:txBody>
+          <a:bodyPr/>
+          <a:lstStyle/>
+          <a:p>
+            <a:r>
+              <a:rPr lang="en-IN" dirty="0" smtClean="0">
+                <a:solidFill>
+                  <a:srgbClr val="FF0000"/>
+                </a:solidFill>
+              </a:rPr>
+              <a:t>ADD PICS</a:t>
+            </a:r>
+            <a:endParaRPr lang="en-IN" dirty="0">
+              <a:solidFill>
+                <a:srgbClr val="FF0000"/>
+              </a:solidFill>
+            </a:endParaRPr>
+          </a:p>
+        </p:txBody>
+      </p:sp>
+    </p:spTree>
+  </p:cSld>
+  <p:clrMapOvr>
+    <a:masterClrMapping/>
+  </p:clrMapOvr>
+</p:sld>
+</file>
+
+<file path=ppt/slides/slide18.xml><?xml version="1.0" encoding="utf-8"?>
+<p:sld xmlns:a="http://schemas.openxmlformats.org/drawingml/2006/main" xmlns:r="http://schemas.openxmlformats.org/officeDocument/2006/relationships" xmlns:p="http://schemas.openxmlformats.org/presentationml/2006/main">
+  <p:cSld>
+    <p:spTree>
+      <p:nvGrpSpPr>
+        <p:cNvPr id="1" name=""/>
+        <p:cNvGrpSpPr/>
+        <p:nvPr/>
+      </p:nvGrpSpPr>
+      <p:grpSpPr>
+        <a:xfrm>
+          <a:off x="0" y="0"/>
+          <a:ext cx="0" cy="0"/>
+          <a:chOff x="0" y="0"/>
+          <a:chExt cx="0" cy="0"/>
+        </a:xfrm>
+      </p:grpSpPr>
+      <p:sp>
+        <p:nvSpPr>
+          <p:cNvPr id="2" name="Title 1"/>
+          <p:cNvSpPr>
+            <a:spLocks noGrp="1"/>
+          </p:cNvSpPr>
+          <p:nvPr>
+            <p:ph type="title"/>
+          </p:nvPr>
+        </p:nvSpPr>
+        <p:spPr/>
+        <p:txBody>
+          <a:bodyPr/>
+          <a:lstStyle/>
+          <a:p>
+            <a:r>
+              <a:rPr lang="en-IN" dirty="0" smtClean="0"/>
+              <a:t>Streaming RS</a:t>
+            </a:r>
+            <a:endParaRPr lang="en-IN" dirty="0"/>
+          </a:p>
+        </p:txBody>
+      </p:sp>
+      <p:sp>
+        <p:nvSpPr>
+          <p:cNvPr id="3" name="Content Placeholder 2"/>
+          <p:cNvSpPr>
+            <a:spLocks noGrp="1"/>
+          </p:cNvSpPr>
+          <p:nvPr>
+            <p:ph idx="1"/>
+          </p:nvPr>
+        </p:nvSpPr>
+        <p:spPr/>
+        <p:txBody>
+          <a:bodyPr/>
+          <a:lstStyle/>
+          <a:p>
+            <a:r>
+              <a:rPr lang="en-IN" dirty="0" smtClean="0">
+                <a:solidFill>
+                  <a:srgbClr val="FF0000"/>
+                </a:solidFill>
+              </a:rPr>
+              <a:t>Details</a:t>
+            </a:r>
+            <a:endParaRPr lang="en-IN" dirty="0">
+              <a:solidFill>
+                <a:srgbClr val="FF0000"/>
+              </a:solidFill>
+            </a:endParaRPr>
+          </a:p>
+        </p:txBody>
+      </p:sp>
+    </p:spTree>
+  </p:cSld>
+  <p:clrMapOvr>
+    <a:masterClrMapping/>
+  </p:clrMapOvr>
+</p:sld>
+</file>
+
+<file path=ppt/slides/slide19.xml><?xml version="1.0" encoding="utf-8"?>
+<p:sld xmlns:a="http://schemas.openxmlformats.org/drawingml/2006/main" xmlns:r="http://schemas.openxmlformats.org/officeDocument/2006/relationships" xmlns:p="http://schemas.openxmlformats.org/presentationml/2006/main">
+  <p:cSld>
+    <p:spTree>
+      <p:nvGrpSpPr>
+        <p:cNvPr id="1" name=""/>
+        <p:cNvGrpSpPr/>
+        <p:nvPr/>
+      </p:nvGrpSpPr>
+      <p:grpSpPr>
+        <a:xfrm>
+          <a:off x="0" y="0"/>
+          <a:ext cx="0" cy="0"/>
+          <a:chOff x="0" y="0"/>
+          <a:chExt cx="0" cy="0"/>
+        </a:xfrm>
+      </p:grpSpPr>
+      <p:sp>
+        <p:nvSpPr>
+          <p:cNvPr id="2" name="Title 1"/>
+          <p:cNvSpPr>
+            <a:spLocks noGrp="1"/>
+          </p:cNvSpPr>
+          <p:nvPr>
+            <p:ph type="title"/>
+          </p:nvPr>
+        </p:nvSpPr>
+        <p:spPr/>
+        <p:txBody>
+          <a:bodyPr/>
+          <a:lstStyle/>
+          <a:p>
+            <a:r>
+              <a:rPr lang="en-IN" dirty="0" smtClean="0">
+                <a:solidFill>
+                  <a:srgbClr val="FF0000"/>
+                </a:solidFill>
+              </a:rPr>
+              <a:t>Topics to cover</a:t>
+            </a:r>
+            <a:endParaRPr lang="en-IN" dirty="0">
+              <a:solidFill>
+                <a:srgbClr val="FF0000"/>
+              </a:solidFill>
+            </a:endParaRPr>
+          </a:p>
+        </p:txBody>
+      </p:sp>
+      <p:sp>
+        <p:nvSpPr>
+          <p:cNvPr id="3" name="Content Placeholder 2"/>
+          <p:cNvSpPr>
+            <a:spLocks noGrp="1"/>
+          </p:cNvSpPr>
+          <p:nvPr>
+            <p:ph idx="1"/>
+          </p:nvPr>
+        </p:nvSpPr>
+        <p:spPr/>
+        <p:txBody>
+          <a:bodyPr/>
+          <a:lstStyle/>
+          <a:p>
+            <a:r>
+              <a:rPr lang="en-IN" dirty="0" smtClean="0">
+                <a:solidFill>
+                  <a:srgbClr val="FF0000"/>
+                </a:solidFill>
+              </a:rPr>
+              <a:t>Group</a:t>
+            </a:r>
+          </a:p>
+          <a:p>
+            <a:r>
+              <a:rPr lang="en-IN" dirty="0" smtClean="0">
+                <a:solidFill>
+                  <a:srgbClr val="FF0000"/>
+                </a:solidFill>
+              </a:rPr>
+              <a:t>Graph</a:t>
+            </a:r>
+          </a:p>
+          <a:p>
+            <a:r>
+              <a:rPr lang="en-IN" dirty="0" smtClean="0">
+                <a:solidFill>
+                  <a:srgbClr val="FF0000"/>
+                </a:solidFill>
+              </a:rPr>
+              <a:t>Implicit Feedback</a:t>
+            </a:r>
+          </a:p>
+          <a:p>
+            <a:r>
+              <a:rPr lang="en-IN" dirty="0" smtClean="0">
+                <a:solidFill>
+                  <a:srgbClr val="FF0000"/>
+                </a:solidFill>
+              </a:rPr>
+              <a:t>Data </a:t>
+            </a:r>
+            <a:r>
+              <a:rPr lang="en-IN" dirty="0" err="1" smtClean="0">
+                <a:solidFill>
+                  <a:srgbClr val="FF0000"/>
+                </a:solidFill>
+              </a:rPr>
+              <a:t>Sparsity</a:t>
+            </a:r>
+            <a:endParaRPr lang="en-IN" dirty="0" smtClean="0">
+              <a:solidFill>
+                <a:srgbClr val="FF0000"/>
+              </a:solidFill>
+            </a:endParaRPr>
+          </a:p>
+          <a:p>
+            <a:r>
+              <a:rPr lang="en-IN" dirty="0" smtClean="0">
+                <a:solidFill>
+                  <a:srgbClr val="FF0000"/>
+                </a:solidFill>
+              </a:rPr>
+              <a:t>Cold Start Problem</a:t>
+            </a:r>
+          </a:p>
+          <a:p>
+            <a:r>
+              <a:rPr lang="en-IN" dirty="0" smtClean="0">
+                <a:solidFill>
+                  <a:srgbClr val="FF0000"/>
+                </a:solidFill>
+              </a:rPr>
+              <a:t>Scalability</a:t>
+            </a:r>
+          </a:p>
+          <a:p>
+            <a:r>
+              <a:rPr lang="en-IN" dirty="0" smtClean="0">
+                <a:solidFill>
+                  <a:srgbClr val="FF0000"/>
+                </a:solidFill>
+              </a:rPr>
+              <a:t>Normalization</a:t>
+            </a:r>
+          </a:p>
+          <a:p>
+            <a:r>
+              <a:rPr lang="en-IN" dirty="0" smtClean="0">
+                <a:solidFill>
+                  <a:srgbClr val="FF0000"/>
+                </a:solidFill>
+              </a:rPr>
+              <a:t>Bias</a:t>
+            </a:r>
+          </a:p>
+        </p:txBody>
+      </p:sp>
+      <p:sp>
+        <p:nvSpPr>
+          <p:cNvPr id="4" name="TextBox 3"/>
           <p:cNvSpPr txBox="1"/>
           <p:nvPr/>
         </p:nvSpPr>
         <p:spPr>
           <a:xfrm>
-            <a:off x="40244" y="2493690"/>
-            <a:ext cx="12171284" cy="910132"/>
+            <a:off x="7103318" y="1701602"/>
+            <a:ext cx="2644250" cy="1938992"/>
           </a:xfrm>
           <a:prstGeom prst="rect">
             <a:avLst/>
@@ -4566,19 +5576,54 @@
           <a:noFill/>
         </p:spPr>
         <p:txBody>
-          <a:bodyPr wrap="square" lIns="108850" tIns="54425" rIns="108850" bIns="54425" rtlCol="0">
+          <a:bodyPr wrap="none" rtlCol="0">
             <a:spAutoFit/>
           </a:bodyPr>
           <a:lstStyle/>
           <a:p>
-            <a:pPr algn="ctr"/>
-            <a:r>
-              <a:rPr lang="en-IN" sz="5200" dirty="0">
-                <a:solidFill>
-                  <a:schemeClr val="bg1"/>
-                </a:solidFill>
-              </a:rPr>
-              <a:t>Thank You</a:t>
+            <a:r>
+              <a:rPr lang="en-IN" sz="2400" dirty="0" smtClean="0"/>
+              <a:t>TO DO-</a:t>
+            </a:r>
+          </a:p>
+          <a:p>
+            <a:pPr>
+              <a:buFont typeface="Arial" pitchFamily="34" charset="0"/>
+              <a:buChar char="•"/>
+            </a:pPr>
+            <a:r>
+              <a:rPr lang="en-IN" sz="2400" dirty="0" smtClean="0"/>
+              <a:t>Evaluation reading</a:t>
+            </a:r>
+          </a:p>
+          <a:p>
+            <a:pPr>
+              <a:buFont typeface="Arial" pitchFamily="34" charset="0"/>
+              <a:buChar char="•"/>
+            </a:pPr>
+            <a:r>
+              <a:rPr lang="en-IN" sz="2400" dirty="0" smtClean="0"/>
+              <a:t>Group by</a:t>
+            </a:r>
+          </a:p>
+          <a:p>
+            <a:pPr>
+              <a:buFont typeface="Arial" pitchFamily="34" charset="0"/>
+              <a:buChar char="•"/>
+            </a:pPr>
+            <a:r>
+              <a:rPr lang="en-IN" sz="2400" dirty="0" smtClean="0"/>
+              <a:t>Diagram taxonomy</a:t>
+            </a:r>
+          </a:p>
+          <a:p>
+            <a:pPr>
+              <a:buFont typeface="Arial" pitchFamily="34" charset="0"/>
+              <a:buChar char="•"/>
+            </a:pPr>
+            <a:r>
+              <a:rPr lang="en-IN" sz="2400" dirty="0" smtClean="0"/>
+              <a:t>Conclusion</a:t>
             </a:r>
           </a:p>
         </p:txBody>
@@ -4588,18 +5633,6 @@
   <p:clrMapOvr>
     <a:masterClrMapping/>
   </p:clrMapOvr>
-  <mc:AlternateContent xmlns:mc="http://schemas.openxmlformats.org/markup-compatibility/2006">
-    <mc:Choice xmlns:p14="http://schemas.microsoft.com/office/powerpoint/2010/main" xmlns="" Requires="p14">
-      <p:transition spd="med" p14:dur="700">
-        <p:fade/>
-      </p:transition>
-    </mc:Choice>
-    <mc:Fallback>
-      <p:transition spd="med">
-        <p:fade/>
-      </p:transition>
-    </mc:Fallback>
-  </mc:AlternateContent>
 </p:sld>
 </file>
 
@@ -4692,6 +5725,164 @@
             <a:r>
               <a:rPr lang="en-IN" dirty="0" smtClean="0"/>
               <a:t>Saves time</a:t>
+            </a:r>
+          </a:p>
+        </p:txBody>
+      </p:sp>
+    </p:spTree>
+  </p:cSld>
+  <p:clrMapOvr>
+    <a:masterClrMapping/>
+  </p:clrMapOvr>
+  <mc:AlternateContent xmlns:mc="http://schemas.openxmlformats.org/markup-compatibility/2006">
+    <mc:Choice xmlns:p14="http://schemas.microsoft.com/office/powerpoint/2010/main" xmlns="" Requires="p14">
+      <p:transition spd="med" p14:dur="700">
+        <p:fade/>
+      </p:transition>
+    </mc:Choice>
+    <mc:Fallback>
+      <p:transition spd="med">
+        <p:fade/>
+      </p:transition>
+    </mc:Fallback>
+  </mc:AlternateContent>
+</p:sld>
+</file>
+
+<file path=ppt/slides/slide20.xml><?xml version="1.0" encoding="utf-8"?>
+<p:sld xmlns:a="http://schemas.openxmlformats.org/drawingml/2006/main" xmlns:r="http://schemas.openxmlformats.org/officeDocument/2006/relationships" xmlns:p="http://schemas.openxmlformats.org/presentationml/2006/main">
+  <p:cSld>
+    <p:spTree>
+      <p:nvGrpSpPr>
+        <p:cNvPr id="1" name=""/>
+        <p:cNvGrpSpPr/>
+        <p:nvPr/>
+      </p:nvGrpSpPr>
+      <p:grpSpPr>
+        <a:xfrm>
+          <a:off x="0" y="0"/>
+          <a:ext cx="0" cy="0"/>
+          <a:chOff x="0" y="0"/>
+          <a:chExt cx="0" cy="0"/>
+        </a:xfrm>
+      </p:grpSpPr>
+      <p:sp>
+        <p:nvSpPr>
+          <p:cNvPr id="2" name="Title 1"/>
+          <p:cNvSpPr>
+            <a:spLocks noGrp="1"/>
+          </p:cNvSpPr>
+          <p:nvPr>
+            <p:ph type="title"/>
+          </p:nvPr>
+        </p:nvSpPr>
+        <p:spPr/>
+        <p:txBody>
+          <a:bodyPr/>
+          <a:lstStyle/>
+          <a:p>
+            <a:r>
+              <a:rPr lang="en-IN" dirty="0" smtClean="0"/>
+              <a:t>Future &amp; Challenges</a:t>
+            </a:r>
+            <a:endParaRPr lang="en-IN" dirty="0"/>
+          </a:p>
+        </p:txBody>
+      </p:sp>
+      <p:sp>
+        <p:nvSpPr>
+          <p:cNvPr id="3" name="Content Placeholder 2"/>
+          <p:cNvSpPr>
+            <a:spLocks noGrp="1"/>
+          </p:cNvSpPr>
+          <p:nvPr>
+            <p:ph idx="1"/>
+          </p:nvPr>
+        </p:nvSpPr>
+        <p:spPr/>
+        <p:txBody>
+          <a:bodyPr/>
+          <a:lstStyle/>
+          <a:p>
+            <a:r>
+              <a:rPr lang="en-IN" dirty="0" smtClean="0">
+                <a:solidFill>
+                  <a:srgbClr val="FF0000"/>
+                </a:solidFill>
+              </a:rPr>
+              <a:t>Details</a:t>
+            </a:r>
+            <a:endParaRPr lang="en-IN" dirty="0">
+              <a:solidFill>
+                <a:srgbClr val="FF0000"/>
+              </a:solidFill>
+            </a:endParaRPr>
+          </a:p>
+        </p:txBody>
+      </p:sp>
+    </p:spTree>
+  </p:cSld>
+  <p:clrMapOvr>
+    <a:masterClrMapping/>
+  </p:clrMapOvr>
+</p:sld>
+</file>
+
+<file path=ppt/slides/slide21.xml><?xml version="1.0" encoding="utf-8"?>
+<p:sld xmlns:a="http://schemas.openxmlformats.org/drawingml/2006/main" xmlns:r="http://schemas.openxmlformats.org/officeDocument/2006/relationships" xmlns:p="http://schemas.openxmlformats.org/presentationml/2006/main">
+  <p:cSld>
+    <p:bg>
+      <p:bgPr>
+        <a:solidFill>
+          <a:srgbClr val="0078D7"/>
+        </a:solidFill>
+        <a:effectLst/>
+      </p:bgPr>
+    </p:bg>
+    <p:spTree>
+      <p:nvGrpSpPr>
+        <p:cNvPr id="1" name=""/>
+        <p:cNvGrpSpPr/>
+        <p:nvPr/>
+      </p:nvGrpSpPr>
+      <p:grpSpPr>
+        <a:xfrm>
+          <a:off x="0" y="0"/>
+          <a:ext cx="0" cy="0"/>
+          <a:chOff x="0" y="0"/>
+          <a:chExt cx="0" cy="0"/>
+        </a:xfrm>
+      </p:grpSpPr>
+      <p:sp>
+        <p:nvSpPr>
+          <p:cNvPr id="5" name="TextBox 4"/>
+          <p:cNvSpPr txBox="1"/>
+          <p:nvPr/>
+        </p:nvSpPr>
+        <p:spPr>
+          <a:xfrm>
+            <a:off x="40244" y="2493690"/>
+            <a:ext cx="12171284" cy="910132"/>
+          </a:xfrm>
+          <a:prstGeom prst="rect">
+            <a:avLst/>
+          </a:prstGeom>
+          <a:noFill/>
+        </p:spPr>
+        <p:txBody>
+          <a:bodyPr wrap="square" lIns="108850" tIns="54425" rIns="108850" bIns="54425" rtlCol="0">
+            <a:spAutoFit/>
+          </a:bodyPr>
+          <a:lstStyle/>
+          <a:p>
+            <a:pPr algn="ctr"/>
+            <a:r>
+              <a:rPr lang="en-IN" sz="5200" dirty="0">
+                <a:solidFill>
+                  <a:schemeClr val="bg1"/>
+                </a:solidFill>
+              </a:rPr>
+              <a:t>Thank You</a:t>
             </a:r>
           </a:p>
         </p:txBody>
@@ -5431,98 +6622,32 @@
           <a:chExt cx="0" cy="0"/>
         </a:xfrm>
       </p:grpSpPr>
-      <p:sp>
-        <p:nvSpPr>
-          <p:cNvPr id="2" name="Title 1"/>
-          <p:cNvSpPr>
-            <a:spLocks noGrp="1"/>
-          </p:cNvSpPr>
-          <p:nvPr>
-            <p:ph type="title"/>
-          </p:nvPr>
-        </p:nvSpPr>
-        <p:spPr/>
-        <p:txBody>
-          <a:bodyPr/>
-          <a:lstStyle/>
-          <a:p>
-            <a:r>
-              <a:rPr lang="en-IN" dirty="0" smtClean="0"/>
-              <a:t>Content Based Filtering</a:t>
-            </a:r>
-            <a:endParaRPr lang="en-IN" dirty="0"/>
-          </a:p>
-        </p:txBody>
-      </p:sp>
-      <p:sp>
-        <p:nvSpPr>
-          <p:cNvPr id="3" name="Content Placeholder 2"/>
-          <p:cNvSpPr>
-            <a:spLocks noGrp="1"/>
-          </p:cNvSpPr>
-          <p:nvPr>
-            <p:ph idx="1"/>
-          </p:nvPr>
-        </p:nvSpPr>
-        <p:spPr/>
-        <p:txBody>
-          <a:bodyPr/>
-          <a:lstStyle/>
-          <a:p>
-            <a:r>
-              <a:rPr lang="en-IN" dirty="0" smtClean="0">
-                <a:solidFill>
-                  <a:srgbClr val="FF0000"/>
-                </a:solidFill>
-              </a:rPr>
-              <a:t>Details</a:t>
-            </a:r>
-          </a:p>
-          <a:p>
-            <a:endParaRPr lang="en-IN" dirty="0" smtClean="0">
-              <a:solidFill>
-                <a:srgbClr val="FF0000"/>
-              </a:solidFill>
-            </a:endParaRPr>
-          </a:p>
-          <a:p>
-            <a:endParaRPr lang="en-IN" dirty="0" smtClean="0">
-              <a:solidFill>
-                <a:srgbClr val="FF0000"/>
-              </a:solidFill>
-            </a:endParaRPr>
-          </a:p>
-          <a:p>
-            <a:endParaRPr lang="en-IN" dirty="0" smtClean="0">
-              <a:solidFill>
-                <a:srgbClr val="FF0000"/>
-              </a:solidFill>
-            </a:endParaRPr>
-          </a:p>
-          <a:p>
-            <a:endParaRPr lang="en-IN" dirty="0" smtClean="0">
-              <a:solidFill>
-                <a:srgbClr val="FF0000"/>
-              </a:solidFill>
-            </a:endParaRPr>
-          </a:p>
-          <a:p>
-            <a:r>
-              <a:rPr lang="en-IN" dirty="0" smtClean="0">
-                <a:solidFill>
-                  <a:srgbClr val="FF0000"/>
-                </a:solidFill>
-              </a:rPr>
-              <a:t>DRAWBACKS</a:t>
-            </a:r>
-            <a:endParaRPr lang="en-IN" dirty="0">
-              <a:solidFill>
-                <a:srgbClr val="FF0000"/>
-              </a:solidFill>
-            </a:endParaRPr>
-          </a:p>
-        </p:txBody>
-      </p:sp>
+      <p:pic>
+        <p:nvPicPr>
+          <p:cNvPr id="2050" name="Picture 2" descr="D:\Final Year Project\summer\ppt\RS_basic.JPG"/>
+          <p:cNvPicPr>
+            <a:picLocks noChangeAspect="1" noChangeArrowheads="1"/>
+          </p:cNvPicPr>
+          <p:nvPr/>
+        </p:nvPicPr>
+        <p:blipFill>
+          <a:blip r:embed="rId2" cstate="print"/>
+          <a:srcRect/>
+          <a:stretch>
+            <a:fillRect/>
+          </a:stretch>
+        </p:blipFill>
+        <p:spPr bwMode="auto">
+          <a:xfrm>
+            <a:off x="3430910" y="117426"/>
+            <a:ext cx="5112568" cy="6560022"/>
+          </a:xfrm>
+          <a:prstGeom prst="rect">
+            <a:avLst/>
+          </a:prstGeom>
+          <a:noFill/>
+        </p:spPr>
+      </p:pic>
     </p:spTree>
   </p:cSld>
   <p:clrMapOvr>
@@ -5550,13 +6675,130 @@
       </p:grpSpPr>
       <p:sp>
         <p:nvSpPr>
+          <p:cNvPr id="2" name="Title 1"/>
+          <p:cNvSpPr>
+            <a:spLocks noGrp="1"/>
+          </p:cNvSpPr>
+          <p:nvPr>
+            <p:ph type="title"/>
+          </p:nvPr>
+        </p:nvSpPr>
+        <p:spPr/>
+        <p:txBody>
+          <a:bodyPr/>
+          <a:lstStyle/>
+          <a:p>
+            <a:r>
+              <a:rPr lang="en-IN" dirty="0" smtClean="0"/>
+              <a:t>Content Based Filtering</a:t>
+            </a:r>
+            <a:endParaRPr lang="en-IN" dirty="0"/>
+          </a:p>
+        </p:txBody>
+      </p:sp>
+      <p:sp>
+        <p:nvSpPr>
+          <p:cNvPr id="3" name="Content Placeholder 2"/>
+          <p:cNvSpPr>
+            <a:spLocks noGrp="1"/>
+          </p:cNvSpPr>
+          <p:nvPr>
+            <p:ph idx="1"/>
+          </p:nvPr>
+        </p:nvSpPr>
+        <p:spPr/>
+        <p:txBody>
+          <a:bodyPr/>
+          <a:lstStyle/>
+          <a:p>
+            <a:r>
+              <a:rPr lang="en-IN" dirty="0" smtClean="0">
+                <a:solidFill>
+                  <a:srgbClr val="FF0000"/>
+                </a:solidFill>
+              </a:rPr>
+              <a:t>Details</a:t>
+            </a:r>
+          </a:p>
+          <a:p>
+            <a:r>
+              <a:rPr lang="en-IN" dirty="0" smtClean="0"/>
+              <a:t>Item details are used to find similarity between items.</a:t>
+            </a:r>
+            <a:endParaRPr lang="en-IN" dirty="0" smtClean="0"/>
+          </a:p>
+          <a:p>
+            <a:endParaRPr lang="en-IN" dirty="0" smtClean="0">
+              <a:solidFill>
+                <a:srgbClr val="FF0000"/>
+              </a:solidFill>
+            </a:endParaRPr>
+          </a:p>
+          <a:p>
+            <a:pPr>
+              <a:buNone/>
+            </a:pPr>
+            <a:endParaRPr lang="en-IN" dirty="0" smtClean="0">
+              <a:solidFill>
+                <a:srgbClr val="FF0000"/>
+              </a:solidFill>
+            </a:endParaRPr>
+          </a:p>
+          <a:p>
+            <a:r>
+              <a:rPr lang="en-IN" dirty="0" smtClean="0">
+                <a:solidFill>
+                  <a:srgbClr val="FF0000"/>
+                </a:solidFill>
+              </a:rPr>
+              <a:t>DRAWBACKS</a:t>
+            </a:r>
+          </a:p>
+          <a:p>
+            <a:r>
+              <a:rPr lang="en-IN" dirty="0" smtClean="0"/>
+              <a:t>Over Specification</a:t>
+            </a:r>
+          </a:p>
+          <a:p>
+            <a:endParaRPr lang="en-IN" dirty="0"/>
+          </a:p>
+        </p:txBody>
+      </p:sp>
+    </p:spTree>
+  </p:cSld>
+  <p:clrMapOvr>
+    <a:masterClrMapping/>
+  </p:clrMapOvr>
+</p:sld>
+</file>
+
+<file path=ppt/slides/slide6.xml><?xml version="1.0" encoding="utf-8"?>
+<p:sld xmlns:a="http://schemas.openxmlformats.org/drawingml/2006/main" xmlns:r="http://schemas.openxmlformats.org/officeDocument/2006/relationships" xmlns:p="http://schemas.openxmlformats.org/presentationml/2006/main">
+  <p:cSld>
+    <p:spTree>
+      <p:nvGrpSpPr>
+        <p:cNvPr id="1" name=""/>
+        <p:cNvGrpSpPr/>
+        <p:nvPr/>
+      </p:nvGrpSpPr>
+      <p:grpSpPr>
+        <a:xfrm>
+          <a:off x="0" y="0"/>
+          <a:ext cx="0" cy="0"/>
+          <a:chOff x="0" y="0"/>
+          <a:chExt cx="0" cy="0"/>
+        </a:xfrm>
+      </p:grpSpPr>
+      <p:sp>
+        <p:nvSpPr>
           <p:cNvPr id="52" name="Rounded Rectangle 51"/>
           <p:cNvSpPr/>
           <p:nvPr/>
         </p:nvSpPr>
         <p:spPr>
           <a:xfrm>
-            <a:off x="2926854" y="3933850"/>
+            <a:off x="2782838" y="4365898"/>
             <a:ext cx="6480720" cy="1584176"/>
           </a:xfrm>
           <a:prstGeom prst="roundRect">
@@ -5649,7 +6891,7 @@
         </p:nvSpPr>
         <p:spPr>
           <a:xfrm>
-            <a:off x="622598" y="3429794"/>
+            <a:off x="478582" y="3861842"/>
             <a:ext cx="1152128" cy="576064"/>
           </a:xfrm>
           <a:prstGeom prst="roundRect">
@@ -5693,7 +6935,7 @@
         </p:nvSpPr>
         <p:spPr>
           <a:xfrm>
-            <a:off x="3502386" y="4221935"/>
+            <a:off x="3358370" y="4653983"/>
             <a:ext cx="1152128" cy="576064"/>
           </a:xfrm>
           <a:prstGeom prst="roundRect">
@@ -5737,7 +6979,7 @@
         </p:nvSpPr>
         <p:spPr>
           <a:xfrm>
-            <a:off x="5302586" y="4221882"/>
+            <a:off x="5158570" y="4653930"/>
             <a:ext cx="1440426" cy="576064"/>
           </a:xfrm>
           <a:prstGeom prst="roundRect">
@@ -5784,7 +7026,7 @@
         </p:nvCxnSpPr>
         <p:spPr>
           <a:xfrm>
-            <a:off x="1774726" y="3717826"/>
+            <a:off x="1630710" y="4149874"/>
             <a:ext cx="1727660" cy="792141"/>
           </a:xfrm>
           <a:prstGeom prst="straightConnector1">
@@ -5820,7 +7062,7 @@
         </p:nvCxnSpPr>
         <p:spPr>
           <a:xfrm flipV="1">
-            <a:off x="4654514" y="4509914"/>
+            <a:off x="4510498" y="4941962"/>
             <a:ext cx="648072" cy="53"/>
           </a:xfrm>
           <a:prstGeom prst="straightConnector1">
@@ -5853,7 +7095,7 @@
         </p:nvSpPr>
         <p:spPr>
           <a:xfrm>
-            <a:off x="10631710" y="3429794"/>
+            <a:off x="10487694" y="3861842"/>
             <a:ext cx="1152128" cy="576064"/>
           </a:xfrm>
           <a:prstGeom prst="roundRect">
@@ -5897,8 +7139,8 @@
         </p:nvSpPr>
         <p:spPr>
           <a:xfrm>
-            <a:off x="3862958" y="1989634"/>
-            <a:ext cx="4608512" cy="1440160"/>
+            <a:off x="3718942" y="1917626"/>
+            <a:ext cx="4608512" cy="1944216"/>
           </a:xfrm>
           <a:prstGeom prst="roundRect">
             <a:avLst/>
@@ -5947,6 +7189,22 @@
           </a:p>
           <a:p>
             <a:pPr algn="ctr"/>
+            <a:endParaRPr lang="en-US" b="1" dirty="0" smtClean="0">
+              <a:solidFill>
+                <a:schemeClr val="bg1"/>
+              </a:solidFill>
+            </a:endParaRPr>
+          </a:p>
+          <a:p>
+            <a:pPr algn="ctr"/>
+            <a:endParaRPr lang="en-US" b="1" dirty="0" smtClean="0">
+              <a:solidFill>
+                <a:schemeClr val="bg1"/>
+              </a:solidFill>
+            </a:endParaRPr>
+          </a:p>
+          <a:p>
+            <a:pPr algn="ctr"/>
             <a:r>
               <a:rPr lang="en-US" b="1" dirty="0" smtClean="0">
                 <a:solidFill>
@@ -5974,7 +7232,7 @@
         </p:nvCxnSpPr>
         <p:spPr>
           <a:xfrm>
-            <a:off x="6743012" y="4509914"/>
+            <a:off x="6598996" y="4941962"/>
             <a:ext cx="648072" cy="53"/>
           </a:xfrm>
           <a:prstGeom prst="straightConnector1">
@@ -6010,8 +7268,8 @@
         </p:nvCxnSpPr>
         <p:spPr>
           <a:xfrm flipV="1">
-            <a:off x="1774726" y="2709714"/>
-            <a:ext cx="2088232" cy="1008112"/>
+            <a:off x="1630710" y="2889734"/>
+            <a:ext cx="2088232" cy="1260140"/>
           </a:xfrm>
           <a:prstGeom prst="straightConnector1">
             <a:avLst/>
@@ -6046,8 +7304,8 @@
         </p:nvCxnSpPr>
         <p:spPr>
           <a:xfrm>
-            <a:off x="8471470" y="2709714"/>
-            <a:ext cx="2160240" cy="1008112"/>
+            <a:off x="8327454" y="2889734"/>
+            <a:ext cx="2160240" cy="1260140"/>
           </a:xfrm>
           <a:prstGeom prst="straightConnector1">
             <a:avLst/>
@@ -6079,7 +7337,7 @@
         </p:nvSpPr>
         <p:spPr>
           <a:xfrm>
-            <a:off x="7391084" y="4221935"/>
+            <a:off x="7247068" y="4653983"/>
             <a:ext cx="1440426" cy="576064"/>
           </a:xfrm>
           <a:prstGeom prst="roundRect">
@@ -6126,7 +7384,7 @@
         </p:nvCxnSpPr>
         <p:spPr>
           <a:xfrm flipV="1">
-            <a:off x="8831510" y="3717826"/>
+            <a:off x="8687494" y="4149874"/>
             <a:ext cx="1800200" cy="792141"/>
           </a:xfrm>
           <a:prstGeom prst="straightConnector1">
@@ -6159,7 +7417,7 @@
         </p:nvSpPr>
         <p:spPr>
           <a:xfrm>
-            <a:off x="5735166" y="2277666"/>
+            <a:off x="4006974" y="2061642"/>
             <a:ext cx="792088" cy="504056"/>
           </a:xfrm>
           <a:prstGeom prst="roundRect">
@@ -6195,106 +7453,275 @@
           </a:p>
         </p:txBody>
       </p:sp>
-    </p:spTree>
-  </p:cSld>
-  <p:clrMapOvr>
-    <a:masterClrMapping/>
-  </p:clrMapOvr>
-</p:sld>
-</file>
-
-<file path=ppt/slides/slide6.xml><?xml version="1.0" encoding="utf-8"?>
-<p:sld xmlns:a="http://schemas.openxmlformats.org/drawingml/2006/main" xmlns:r="http://schemas.openxmlformats.org/officeDocument/2006/relationships" xmlns:p="http://schemas.openxmlformats.org/presentationml/2006/main">
-  <p:cSld>
-    <p:spTree>
-      <p:nvGrpSpPr>
-        <p:cNvPr id="1" name=""/>
-        <p:cNvGrpSpPr/>
-        <p:nvPr/>
-      </p:nvGrpSpPr>
-      <p:grpSpPr>
-        <a:xfrm>
-          <a:off x="0" y="0"/>
-          <a:ext cx="0" cy="0"/>
-          <a:chOff x="0" y="0"/>
-          <a:chExt cx="0" cy="0"/>
-        </a:xfrm>
-      </p:grpSpPr>
-      <p:sp>
-        <p:nvSpPr>
-          <p:cNvPr id="2" name="Title 1"/>
-          <p:cNvSpPr>
-            <a:spLocks noGrp="1"/>
-          </p:cNvSpPr>
-          <p:nvPr>
-            <p:ph type="title"/>
-          </p:nvPr>
-        </p:nvSpPr>
-        <p:spPr/>
-        <p:txBody>
-          <a:bodyPr/>
-          <a:lstStyle/>
-          <a:p>
-            <a:r>
-              <a:rPr lang="en-IN" dirty="0" smtClean="0"/>
-              <a:t>Memory Based CF</a:t>
-            </a:r>
-            <a:endParaRPr lang="en-IN" dirty="0"/>
-          </a:p>
-        </p:txBody>
-      </p:sp>
-      <p:sp>
-        <p:nvSpPr>
-          <p:cNvPr id="3" name="Content Placeholder 2"/>
-          <p:cNvSpPr>
-            <a:spLocks noGrp="1"/>
-          </p:cNvSpPr>
-          <p:nvPr>
-            <p:ph idx="1"/>
-          </p:nvPr>
-        </p:nvSpPr>
-        <p:spPr/>
-        <p:txBody>
-          <a:bodyPr/>
-          <a:lstStyle/>
-          <a:p>
-            <a:r>
-              <a:rPr lang="en-IN" dirty="0" smtClean="0"/>
-              <a:t>User Based</a:t>
-            </a:r>
-          </a:p>
-          <a:p>
-            <a:pPr lvl="1"/>
-            <a:r>
-              <a:rPr lang="en-IN" dirty="0" smtClean="0">
-                <a:solidFill>
-                  <a:srgbClr val="FF0000"/>
-                </a:solidFill>
-              </a:rPr>
-              <a:t>Details</a:t>
-            </a:r>
-          </a:p>
-          <a:p>
-            <a:r>
-              <a:rPr lang="en-IN" dirty="0" smtClean="0"/>
-              <a:t>Item Based</a:t>
-            </a:r>
-          </a:p>
-          <a:p>
-            <a:pPr lvl="1"/>
-            <a:r>
-              <a:rPr lang="en-IN" dirty="0" smtClean="0">
-                <a:solidFill>
-                  <a:srgbClr val="FF0000"/>
-                </a:solidFill>
-              </a:rPr>
-              <a:t>Details</a:t>
-            </a:r>
-            <a:endParaRPr lang="en-IN" dirty="0">
-              <a:solidFill>
-                <a:srgbClr val="FF0000"/>
-              </a:solidFill>
-            </a:endParaRPr>
+      <p:sp>
+        <p:nvSpPr>
+          <p:cNvPr id="66" name="Rectangle: Rounded Corners 4"/>
+          <p:cNvSpPr/>
+          <p:nvPr/>
+        </p:nvSpPr>
+        <p:spPr>
+          <a:xfrm>
+            <a:off x="4943078" y="2061642"/>
+            <a:ext cx="1080120" cy="504056"/>
+          </a:xfrm>
+          <a:prstGeom prst="roundRect">
+            <a:avLst/>
+          </a:prstGeom>
+        </p:spPr>
+        <p:style>
+          <a:lnRef idx="2">
+            <a:schemeClr val="accent1">
+              <a:shade val="50000"/>
+            </a:schemeClr>
+          </a:lnRef>
+          <a:fillRef idx="1">
+            <a:schemeClr val="accent1"/>
+          </a:fillRef>
+          <a:effectRef idx="0">
+            <a:schemeClr val="accent1"/>
+          </a:effectRef>
+          <a:fontRef idx="minor">
+            <a:schemeClr val="lt1"/>
+          </a:fontRef>
+        </p:style>
+        <p:txBody>
+          <a:bodyPr rtlCol="0" anchor="ctr"/>
+          <a:lstStyle/>
+          <a:p>
+            <a:pPr algn="ctr"/>
+            <a:r>
+              <a:rPr lang="en-US" dirty="0" smtClean="0"/>
+              <a:t>Bayesian</a:t>
+            </a:r>
+            <a:endParaRPr lang="en-US" dirty="0"/>
+          </a:p>
+        </p:txBody>
+      </p:sp>
+      <p:sp>
+        <p:nvSpPr>
+          <p:cNvPr id="67" name="Rectangle: Rounded Corners 4"/>
+          <p:cNvSpPr/>
+          <p:nvPr/>
+        </p:nvSpPr>
+        <p:spPr>
+          <a:xfrm>
+            <a:off x="6167214" y="2061642"/>
+            <a:ext cx="792088" cy="504056"/>
+          </a:xfrm>
+          <a:prstGeom prst="roundRect">
+            <a:avLst/>
+          </a:prstGeom>
+        </p:spPr>
+        <p:style>
+          <a:lnRef idx="2">
+            <a:schemeClr val="accent1">
+              <a:shade val="50000"/>
+            </a:schemeClr>
+          </a:lnRef>
+          <a:fillRef idx="1">
+            <a:schemeClr val="accent1"/>
+          </a:fillRef>
+          <a:effectRef idx="0">
+            <a:schemeClr val="accent1"/>
+          </a:effectRef>
+          <a:fontRef idx="minor">
+            <a:schemeClr val="lt1"/>
+          </a:fontRef>
+        </p:style>
+        <p:txBody>
+          <a:bodyPr rtlCol="0" anchor="ctr"/>
+          <a:lstStyle/>
+          <a:p>
+            <a:pPr algn="ctr"/>
+            <a:r>
+              <a:rPr lang="en-US" dirty="0" smtClean="0"/>
+              <a:t>NN</a:t>
+            </a:r>
+            <a:endParaRPr lang="en-US" dirty="0"/>
+          </a:p>
+        </p:txBody>
+      </p:sp>
+      <p:sp>
+        <p:nvSpPr>
+          <p:cNvPr id="68" name="Rectangle: Rounded Corners 4"/>
+          <p:cNvSpPr/>
+          <p:nvPr/>
+        </p:nvSpPr>
+        <p:spPr>
+          <a:xfrm>
+            <a:off x="7103318" y="2061642"/>
+            <a:ext cx="936104" cy="504056"/>
+          </a:xfrm>
+          <a:prstGeom prst="roundRect">
+            <a:avLst/>
+          </a:prstGeom>
+        </p:spPr>
+        <p:style>
+          <a:lnRef idx="2">
+            <a:schemeClr val="accent1">
+              <a:shade val="50000"/>
+            </a:schemeClr>
+          </a:lnRef>
+          <a:fillRef idx="1">
+            <a:schemeClr val="accent1"/>
+          </a:fillRef>
+          <a:effectRef idx="0">
+            <a:schemeClr val="accent1"/>
+          </a:effectRef>
+          <a:fontRef idx="minor">
+            <a:schemeClr val="lt1"/>
+          </a:fontRef>
+        </p:style>
+        <p:txBody>
+          <a:bodyPr rtlCol="0" anchor="ctr"/>
+          <a:lstStyle/>
+          <a:p>
+            <a:pPr algn="ctr"/>
+            <a:r>
+              <a:rPr lang="en-US" dirty="0" smtClean="0"/>
+              <a:t>Fuzzy system</a:t>
+            </a:r>
+            <a:endParaRPr lang="en-US" dirty="0"/>
+          </a:p>
+        </p:txBody>
+      </p:sp>
+      <p:sp>
+        <p:nvSpPr>
+          <p:cNvPr id="69" name="Rectangle: Rounded Corners 4"/>
+          <p:cNvSpPr/>
+          <p:nvPr/>
+        </p:nvSpPr>
+        <p:spPr>
+          <a:xfrm>
+            <a:off x="3934966" y="2709714"/>
+            <a:ext cx="1296144" cy="504056"/>
+          </a:xfrm>
+          <a:prstGeom prst="roundRect">
+            <a:avLst/>
+          </a:prstGeom>
+        </p:spPr>
+        <p:style>
+          <a:lnRef idx="2">
+            <a:schemeClr val="accent1">
+              <a:shade val="50000"/>
+            </a:schemeClr>
+          </a:lnRef>
+          <a:fillRef idx="1">
+            <a:schemeClr val="accent1"/>
+          </a:fillRef>
+          <a:effectRef idx="0">
+            <a:schemeClr val="accent1"/>
+          </a:effectRef>
+          <a:fontRef idx="minor">
+            <a:schemeClr val="lt1"/>
+          </a:fontRef>
+        </p:style>
+        <p:txBody>
+          <a:bodyPr rtlCol="0" anchor="ctr"/>
+          <a:lstStyle/>
+          <a:p>
+            <a:pPr algn="ctr"/>
+            <a:r>
+              <a:rPr lang="en-US" dirty="0" smtClean="0"/>
+              <a:t>Genetic </a:t>
+            </a:r>
+            <a:r>
+              <a:rPr lang="en-US" dirty="0" smtClean="0"/>
+              <a:t>A</a:t>
+            </a:r>
+            <a:r>
+              <a:rPr lang="en-US" dirty="0" smtClean="0"/>
+              <a:t>lgorithm</a:t>
+            </a:r>
+            <a:endParaRPr lang="en-US" dirty="0"/>
+          </a:p>
+        </p:txBody>
+      </p:sp>
+      <p:sp>
+        <p:nvSpPr>
+          <p:cNvPr id="70" name="Rectangle: Rounded Corners 4"/>
+          <p:cNvSpPr/>
+          <p:nvPr/>
+        </p:nvSpPr>
+        <p:spPr>
+          <a:xfrm>
+            <a:off x="5447134" y="2709714"/>
+            <a:ext cx="1008112" cy="504056"/>
+          </a:xfrm>
+          <a:prstGeom prst="roundRect">
+            <a:avLst/>
+          </a:prstGeom>
+        </p:spPr>
+        <p:style>
+          <a:lnRef idx="2">
+            <a:schemeClr val="accent1">
+              <a:shade val="50000"/>
+            </a:schemeClr>
+          </a:lnRef>
+          <a:fillRef idx="1">
+            <a:schemeClr val="accent1"/>
+          </a:fillRef>
+          <a:effectRef idx="0">
+            <a:schemeClr val="accent1"/>
+          </a:effectRef>
+          <a:fontRef idx="minor">
+            <a:schemeClr val="lt1"/>
+          </a:fontRef>
+        </p:style>
+        <p:txBody>
+          <a:bodyPr rtlCol="0" anchor="ctr"/>
+          <a:lstStyle/>
+          <a:p>
+            <a:pPr algn="ctr"/>
+            <a:r>
+              <a:rPr lang="en-US" dirty="0" smtClean="0"/>
+              <a:t>Latent Feature</a:t>
+            </a:r>
+            <a:endParaRPr lang="en-US" dirty="0"/>
+          </a:p>
+        </p:txBody>
+      </p:sp>
+      <p:sp>
+        <p:nvSpPr>
+          <p:cNvPr id="73" name="Rectangle: Rounded Corners 4"/>
+          <p:cNvSpPr/>
+          <p:nvPr/>
+        </p:nvSpPr>
+        <p:spPr>
+          <a:xfrm>
+            <a:off x="6599262" y="2709714"/>
+            <a:ext cx="1440160" cy="504056"/>
+          </a:xfrm>
+          <a:prstGeom prst="roundRect">
+            <a:avLst/>
+          </a:prstGeom>
+        </p:spPr>
+        <p:style>
+          <a:lnRef idx="2">
+            <a:schemeClr val="accent1">
+              <a:shade val="50000"/>
+            </a:schemeClr>
+          </a:lnRef>
+          <a:fillRef idx="1">
+            <a:schemeClr val="accent1"/>
+          </a:fillRef>
+          <a:effectRef idx="0">
+            <a:schemeClr val="accent1"/>
+          </a:effectRef>
+          <a:fontRef idx="minor">
+            <a:schemeClr val="lt1"/>
+          </a:fontRef>
+        </p:style>
+        <p:txBody>
+          <a:bodyPr rtlCol="0" anchor="ctr"/>
+          <a:lstStyle/>
+          <a:p>
+            <a:pPr algn="ctr"/>
+            <a:r>
+              <a:rPr lang="en-US" dirty="0" smtClean="0"/>
+              <a:t>Matrix Factorization</a:t>
+            </a:r>
+            <a:endParaRPr lang="en-US" dirty="0"/>
           </a:p>
         </p:txBody>
       </p:sp>
@@ -6340,35 +7767,51 @@
           <a:p>
             <a:r>
               <a:rPr lang="en-IN" dirty="0" smtClean="0"/>
-              <a:t>Memory Based CF - </a:t>
-            </a:r>
+              <a:t>Memory Based CF</a:t>
+            </a:r>
+            <a:endParaRPr lang="en-IN" dirty="0"/>
+          </a:p>
+        </p:txBody>
+      </p:sp>
+      <p:sp>
+        <p:nvSpPr>
+          <p:cNvPr id="3" name="Content Placeholder 2"/>
+          <p:cNvSpPr>
+            <a:spLocks noGrp="1"/>
+          </p:cNvSpPr>
+          <p:nvPr>
+            <p:ph idx="1"/>
+          </p:nvPr>
+        </p:nvSpPr>
+        <p:spPr/>
+        <p:txBody>
+          <a:bodyPr/>
+          <a:lstStyle/>
+          <a:p>
             <a:r>
               <a:rPr lang="en-IN" dirty="0" smtClean="0"/>
-              <a:t>Similarity </a:t>
-            </a:r>
+              <a:t>User Based</a:t>
+            </a:r>
+          </a:p>
+          <a:p>
+            <a:pPr lvl="1"/>
+            <a:r>
+              <a:rPr lang="en-IN" dirty="0" smtClean="0">
+                <a:solidFill>
+                  <a:srgbClr val="FF0000"/>
+                </a:solidFill>
+              </a:rPr>
+              <a:t>Details</a:t>
+            </a:r>
+          </a:p>
+          <a:p>
             <a:r>
               <a:rPr lang="en-IN" dirty="0" smtClean="0"/>
-              <a:t>Metric</a:t>
-            </a:r>
-            <a:endParaRPr lang="en-IN" dirty="0"/>
-          </a:p>
-        </p:txBody>
-      </p:sp>
-      <p:sp>
-        <p:nvSpPr>
-          <p:cNvPr id="3" name="Content Placeholder 2"/>
-          <p:cNvSpPr>
-            <a:spLocks noGrp="1"/>
-          </p:cNvSpPr>
-          <p:nvPr>
-            <p:ph idx="1"/>
-          </p:nvPr>
-        </p:nvSpPr>
-        <p:spPr/>
-        <p:txBody>
-          <a:bodyPr/>
-          <a:lstStyle/>
-          <a:p>
+              <a:t>Item Based</a:t>
+            </a:r>
+          </a:p>
+          <a:p>
+            <a:pPr lvl="1"/>
             <a:r>
               <a:rPr lang="en-IN" dirty="0" smtClean="0">
                 <a:solidFill>
@@ -6427,7 +7870,15 @@
           <a:p>
             <a:r>
               <a:rPr lang="en-IN" dirty="0" smtClean="0"/>
-              <a:t>Memory Based CF – Aggregation Method</a:t>
+              <a:t>Memory Based CF - </a:t>
+            </a:r>
+            <a:r>
+              <a:rPr lang="en-IN" dirty="0" smtClean="0"/>
+              <a:t>Similarity </a:t>
+            </a:r>
+            <a:r>
+              <a:rPr lang="en-IN" dirty="0" smtClean="0"/>
+              <a:t>Metric</a:t>
             </a:r>
             <a:endParaRPr lang="en-IN" dirty="0"/>
           </a:p>
@@ -6506,7 +7957,7 @@
           <a:p>
             <a:r>
               <a:rPr lang="en-IN" dirty="0" smtClean="0"/>
-              <a:t>Model Based CF - SVD</a:t>
+              <a:t>Memory Based CF – Aggregation Method</a:t>
             </a:r>
             <a:endParaRPr lang="en-IN" dirty="0"/>
           </a:p>

</xml_diff>